<commit_message>
added an info chip
</commit_message>
<xml_diff>
--- a/artwork/dogbone.pptx
+++ b/artwork/dogbone.pptx
@@ -7,6 +7,7 @@
   <p:sldIdLst>
     <p:sldId id="260" r:id="rId2"/>
     <p:sldId id="261" r:id="rId3"/>
+    <p:sldId id="262" r:id="rId4"/>
   </p:sldIdLst>
   <p:sldSz cx="12192000" cy="6858000"/>
   <p:notesSz cx="6858000" cy="9144000"/>
@@ -260,7 +261,7 @@
           <a:p>
             <a:fld id="{3C77549D-327E-1344-B243-398D92E8956E}" type="datetimeFigureOut">
               <a:rPr lang="en-US" smtClean="0"/>
-              <a:t>1/26/23</a:t>
+              <a:t>2/14/23</a:t>
             </a:fld>
             <a:endParaRPr lang="en-US"/>
           </a:p>
@@ -458,7 +459,7 @@
           <a:p>
             <a:fld id="{3C77549D-327E-1344-B243-398D92E8956E}" type="datetimeFigureOut">
               <a:rPr lang="en-US" smtClean="0"/>
-              <a:t>1/26/23</a:t>
+              <a:t>2/14/23</a:t>
             </a:fld>
             <a:endParaRPr lang="en-US"/>
           </a:p>
@@ -666,7 +667,7 @@
           <a:p>
             <a:fld id="{3C77549D-327E-1344-B243-398D92E8956E}" type="datetimeFigureOut">
               <a:rPr lang="en-US" smtClean="0"/>
-              <a:t>1/26/23</a:t>
+              <a:t>2/14/23</a:t>
             </a:fld>
             <a:endParaRPr lang="en-US"/>
           </a:p>
@@ -864,7 +865,7 @@
           <a:p>
             <a:fld id="{3C77549D-327E-1344-B243-398D92E8956E}" type="datetimeFigureOut">
               <a:rPr lang="en-US" smtClean="0"/>
-              <a:t>1/26/23</a:t>
+              <a:t>2/14/23</a:t>
             </a:fld>
             <a:endParaRPr lang="en-US"/>
           </a:p>
@@ -1139,7 +1140,7 @@
           <a:p>
             <a:fld id="{3C77549D-327E-1344-B243-398D92E8956E}" type="datetimeFigureOut">
               <a:rPr lang="en-US" smtClean="0"/>
-              <a:t>1/26/23</a:t>
+              <a:t>2/14/23</a:t>
             </a:fld>
             <a:endParaRPr lang="en-US"/>
           </a:p>
@@ -1404,7 +1405,7 @@
           <a:p>
             <a:fld id="{3C77549D-327E-1344-B243-398D92E8956E}" type="datetimeFigureOut">
               <a:rPr lang="en-US" smtClean="0"/>
-              <a:t>1/26/23</a:t>
+              <a:t>2/14/23</a:t>
             </a:fld>
             <a:endParaRPr lang="en-US"/>
           </a:p>
@@ -1816,7 +1817,7 @@
           <a:p>
             <a:fld id="{3C77549D-327E-1344-B243-398D92E8956E}" type="datetimeFigureOut">
               <a:rPr lang="en-US" smtClean="0"/>
-              <a:t>1/26/23</a:t>
+              <a:t>2/14/23</a:t>
             </a:fld>
             <a:endParaRPr lang="en-US"/>
           </a:p>
@@ -1957,7 +1958,7 @@
           <a:p>
             <a:fld id="{3C77549D-327E-1344-B243-398D92E8956E}" type="datetimeFigureOut">
               <a:rPr lang="en-US" smtClean="0"/>
-              <a:t>1/26/23</a:t>
+              <a:t>2/14/23</a:t>
             </a:fld>
             <a:endParaRPr lang="en-US"/>
           </a:p>
@@ -2070,7 +2071,7 @@
           <a:p>
             <a:fld id="{3C77549D-327E-1344-B243-398D92E8956E}" type="datetimeFigureOut">
               <a:rPr lang="en-US" smtClean="0"/>
-              <a:t>1/26/23</a:t>
+              <a:t>2/14/23</a:t>
             </a:fld>
             <a:endParaRPr lang="en-US"/>
           </a:p>
@@ -2381,7 +2382,7 @@
           <a:p>
             <a:fld id="{3C77549D-327E-1344-B243-398D92E8956E}" type="datetimeFigureOut">
               <a:rPr lang="en-US" smtClean="0"/>
-              <a:t>1/26/23</a:t>
+              <a:t>2/14/23</a:t>
             </a:fld>
             <a:endParaRPr lang="en-US"/>
           </a:p>
@@ -2669,7 +2670,7 @@
           <a:p>
             <a:fld id="{3C77549D-327E-1344-B243-398D92E8956E}" type="datetimeFigureOut">
               <a:rPr lang="en-US" smtClean="0"/>
-              <a:t>1/26/23</a:t>
+              <a:t>2/14/23</a:t>
             </a:fld>
             <a:endParaRPr lang="en-US"/>
           </a:p>
@@ -2910,7 +2911,7 @@
           <a:p>
             <a:fld id="{3C77549D-327E-1344-B243-398D92E8956E}" type="datetimeFigureOut">
               <a:rPr lang="en-US" smtClean="0"/>
-              <a:t>1/26/23</a:t>
+              <a:t>2/14/23</a:t>
             </a:fld>
             <a:endParaRPr lang="en-US"/>
           </a:p>
@@ -5313,6 +5314,1317 @@
 </p:sld>
 </file>
 
+<file path=ppt/slides/slide3.xml><?xml version="1.0" encoding="utf-8"?>
+<p:sld xmlns:a="http://schemas.openxmlformats.org/drawingml/2006/main" xmlns:r="http://schemas.openxmlformats.org/officeDocument/2006/relationships" xmlns:p="http://schemas.openxmlformats.org/presentationml/2006/main">
+  <p:cSld>
+    <p:spTree>
+      <p:nvGrpSpPr>
+        <p:cNvPr id="1" name=""/>
+        <p:cNvGrpSpPr/>
+        <p:nvPr/>
+      </p:nvGrpSpPr>
+      <p:grpSpPr>
+        <a:xfrm>
+          <a:off x="0" y="0"/>
+          <a:ext cx="0" cy="0"/>
+          <a:chOff x="0" y="0"/>
+          <a:chExt cx="0" cy="0"/>
+        </a:xfrm>
+      </p:grpSpPr>
+      <p:grpSp>
+        <p:nvGrpSpPr>
+          <p:cNvPr id="2" name="Group 1">
+            <a:extLst>
+              <a:ext uri="{FF2B5EF4-FFF2-40B4-BE49-F238E27FC236}">
+                <a16:creationId xmlns:a16="http://schemas.microsoft.com/office/drawing/2014/main" id="{EF1497F2-768F-9AF2-066B-2B5332F37E0B}"/>
+              </a:ext>
+            </a:extLst>
+          </p:cNvPr>
+          <p:cNvGrpSpPr/>
+          <p:nvPr/>
+        </p:nvGrpSpPr>
+        <p:grpSpPr>
+          <a:xfrm>
+            <a:off x="2921875" y="214533"/>
+            <a:ext cx="6264165" cy="6252850"/>
+            <a:chOff x="686296" y="975290"/>
+            <a:chExt cx="4108288" cy="4100867"/>
+          </a:xfrm>
+        </p:grpSpPr>
+        <p:sp>
+          <p:nvSpPr>
+            <p:cNvPr id="3" name="Oval 2">
+              <a:extLst>
+                <a:ext uri="{FF2B5EF4-FFF2-40B4-BE49-F238E27FC236}">
+                  <a16:creationId xmlns:a16="http://schemas.microsoft.com/office/drawing/2014/main" id="{F237D956-C832-28DA-C7CC-07C2D553DE12}"/>
+                </a:ext>
+              </a:extLst>
+            </p:cNvPr>
+            <p:cNvSpPr/>
+            <p:nvPr/>
+          </p:nvSpPr>
+          <p:spPr>
+            <a:xfrm>
+              <a:off x="1667322" y="2112579"/>
+              <a:ext cx="1780071" cy="1675143"/>
+            </a:xfrm>
+            <a:custGeom>
+              <a:avLst/>
+              <a:gdLst>
+                <a:gd name="connsiteX0" fmla="*/ 0 w 2714186"/>
+                <a:gd name="connsiteY0" fmla="*/ 1277098 h 2554196"/>
+                <a:gd name="connsiteX1" fmla="*/ 1357093 w 2714186"/>
+                <a:gd name="connsiteY1" fmla="*/ 0 h 2554196"/>
+                <a:gd name="connsiteX2" fmla="*/ 2714186 w 2714186"/>
+                <a:gd name="connsiteY2" fmla="*/ 1277098 h 2554196"/>
+                <a:gd name="connsiteX3" fmla="*/ 1357093 w 2714186"/>
+                <a:gd name="connsiteY3" fmla="*/ 2554196 h 2554196"/>
+                <a:gd name="connsiteX4" fmla="*/ 0 w 2714186"/>
+                <a:gd name="connsiteY4" fmla="*/ 1277098 h 2554196"/>
+              </a:gdLst>
+              <a:ahLst/>
+              <a:cxnLst>
+                <a:cxn ang="0">
+                  <a:pos x="connsiteX0" y="connsiteY0"/>
+                </a:cxn>
+                <a:cxn ang="0">
+                  <a:pos x="connsiteX1" y="connsiteY1"/>
+                </a:cxn>
+                <a:cxn ang="0">
+                  <a:pos x="connsiteX2" y="connsiteY2"/>
+                </a:cxn>
+                <a:cxn ang="0">
+                  <a:pos x="connsiteX3" y="connsiteY3"/>
+                </a:cxn>
+                <a:cxn ang="0">
+                  <a:pos x="connsiteX4" y="connsiteY4"/>
+                </a:cxn>
+              </a:cxnLst>
+              <a:rect l="l" t="t" r="r" b="b"/>
+              <a:pathLst>
+                <a:path w="2714186" h="2554196" fill="none" extrusionOk="0">
+                  <a:moveTo>
+                    <a:pt x="0" y="1277098"/>
+                  </a:moveTo>
+                  <a:cubicBezTo>
+                    <a:pt x="76444" y="578043"/>
+                    <a:pt x="557394" y="60294"/>
+                    <a:pt x="1357093" y="0"/>
+                  </a:cubicBezTo>
+                  <a:cubicBezTo>
+                    <a:pt x="2169268" y="98025"/>
+                    <a:pt x="2659869" y="398516"/>
+                    <a:pt x="2714186" y="1277098"/>
+                  </a:cubicBezTo>
+                  <a:cubicBezTo>
+                    <a:pt x="2649967" y="1912366"/>
+                    <a:pt x="2139829" y="2552476"/>
+                    <a:pt x="1357093" y="2554196"/>
+                  </a:cubicBezTo>
+                  <a:cubicBezTo>
+                    <a:pt x="544693" y="2748319"/>
+                    <a:pt x="34631" y="2026551"/>
+                    <a:pt x="0" y="1277098"/>
+                  </a:cubicBezTo>
+                  <a:close/>
+                </a:path>
+                <a:path w="2714186" h="2554196" stroke="0" extrusionOk="0">
+                  <a:moveTo>
+                    <a:pt x="0" y="1277098"/>
+                  </a:moveTo>
+                  <a:cubicBezTo>
+                    <a:pt x="-174367" y="675041"/>
+                    <a:pt x="661323" y="58047"/>
+                    <a:pt x="1357093" y="0"/>
+                  </a:cubicBezTo>
+                  <a:cubicBezTo>
+                    <a:pt x="2178719" y="-86207"/>
+                    <a:pt x="2621666" y="527355"/>
+                    <a:pt x="2714186" y="1277098"/>
+                  </a:cubicBezTo>
+                  <a:cubicBezTo>
+                    <a:pt x="2626283" y="2108251"/>
+                    <a:pt x="2210862" y="2514566"/>
+                    <a:pt x="1357093" y="2554196"/>
+                  </a:cubicBezTo>
+                  <a:cubicBezTo>
+                    <a:pt x="654099" y="2561148"/>
+                    <a:pt x="-124124" y="2004866"/>
+                    <a:pt x="0" y="1277098"/>
+                  </a:cubicBezTo>
+                  <a:close/>
+                </a:path>
+              </a:pathLst>
+            </a:custGeom>
+            <a:solidFill>
+              <a:srgbClr val="BFBFB3"/>
+            </a:solidFill>
+            <a:ln w="76200">
+              <a:solidFill>
+                <a:srgbClr val="50424A"/>
+              </a:solidFill>
+              <a:extLst>
+                <a:ext uri="{C807C97D-BFC1-408E-A445-0C87EB9F89A2}">
+                  <ask:lineSketchStyleProps xmlns:ask="http://schemas.microsoft.com/office/drawing/2018/sketchyshapes" sd="3989574929">
+                    <a:prstGeom prst="ellipse">
+                      <a:avLst/>
+                    </a:prstGeom>
+                    <ask:type>
+                      <ask:lineSketchScribble/>
+                    </ask:type>
+                  </ask:lineSketchStyleProps>
+                </a:ext>
+              </a:extLst>
+            </a:ln>
+          </p:spPr>
+          <p:style>
+            <a:lnRef idx="2">
+              <a:schemeClr val="accent1">
+                <a:shade val="50000"/>
+              </a:schemeClr>
+            </a:lnRef>
+            <a:fillRef idx="1">
+              <a:schemeClr val="accent1"/>
+            </a:fillRef>
+            <a:effectRef idx="0">
+              <a:schemeClr val="accent1"/>
+            </a:effectRef>
+            <a:fontRef idx="minor">
+              <a:schemeClr val="lt1"/>
+            </a:fontRef>
+          </p:style>
+          <p:txBody>
+            <a:bodyPr rtlCol="0" anchor="ctr"/>
+            <a:lstStyle/>
+            <a:p>
+              <a:pPr algn="ctr"/>
+              <a:endParaRPr lang="en-US"/>
+            </a:p>
+          </p:txBody>
+        </p:sp>
+        <p:sp>
+          <p:nvSpPr>
+            <p:cNvPr id="4" name="Freeform 3">
+              <a:extLst>
+                <a:ext uri="{FF2B5EF4-FFF2-40B4-BE49-F238E27FC236}">
+                  <a16:creationId xmlns:a16="http://schemas.microsoft.com/office/drawing/2014/main" id="{16AA3C23-0BED-A3D1-B0FB-CAEBBDD5A878}"/>
+                </a:ext>
+              </a:extLst>
+            </p:cNvPr>
+            <p:cNvSpPr/>
+            <p:nvPr/>
+          </p:nvSpPr>
+          <p:spPr>
+            <a:xfrm>
+              <a:off x="686296" y="975290"/>
+              <a:ext cx="4108288" cy="4100867"/>
+            </a:xfrm>
+            <a:custGeom>
+              <a:avLst/>
+              <a:gdLst>
+                <a:gd name="connsiteX0" fmla="*/ 840196 w 4108426"/>
+                <a:gd name="connsiteY0" fmla="*/ 2656356 h 4091282"/>
+                <a:gd name="connsiteX1" fmla="*/ 2489114 w 4108426"/>
+                <a:gd name="connsiteY1" fmla="*/ 924992 h 4091282"/>
+                <a:gd name="connsiteX2" fmla="*/ 2683986 w 4108426"/>
+                <a:gd name="connsiteY2" fmla="*/ 3097 h 4091282"/>
+                <a:gd name="connsiteX3" fmla="*/ 3246117 w 4108426"/>
+                <a:gd name="connsiteY3" fmla="*/ 625189 h 4091282"/>
+                <a:gd name="connsiteX4" fmla="*/ 3673337 w 4108426"/>
+                <a:gd name="connsiteY4" fmla="*/ 617694 h 4091282"/>
+                <a:gd name="connsiteX5" fmla="*/ 4108052 w 4108426"/>
+                <a:gd name="connsiteY5" fmla="*/ 1119864 h 4091282"/>
+                <a:gd name="connsiteX6" fmla="*/ 3598386 w 4108426"/>
+                <a:gd name="connsiteY6" fmla="*/ 1532094 h 4091282"/>
+                <a:gd name="connsiteX7" fmla="*/ 2998779 w 4108426"/>
+                <a:gd name="connsiteY7" fmla="*/ 1367202 h 4091282"/>
+                <a:gd name="connsiteX8" fmla="*/ 2751442 w 4108426"/>
+                <a:gd name="connsiteY8" fmla="*/ 1457143 h 4091282"/>
+                <a:gd name="connsiteX9" fmla="*/ 1739606 w 4108426"/>
+                <a:gd name="connsiteY9" fmla="*/ 2453989 h 4091282"/>
+                <a:gd name="connsiteX10" fmla="*/ 1319881 w 4108426"/>
+                <a:gd name="connsiteY10" fmla="*/ 3016120 h 4091282"/>
+                <a:gd name="connsiteX11" fmla="*/ 1274911 w 4108426"/>
+                <a:gd name="connsiteY11" fmla="*/ 3323418 h 4091282"/>
+                <a:gd name="connsiteX12" fmla="*/ 1394832 w 4108426"/>
+                <a:gd name="connsiteY12" fmla="*/ 3803104 h 4091282"/>
+                <a:gd name="connsiteX13" fmla="*/ 1207455 w 4108426"/>
+                <a:gd name="connsiteY13" fmla="*/ 4087917 h 4091282"/>
+                <a:gd name="connsiteX14" fmla="*/ 847691 w 4108426"/>
+                <a:gd name="connsiteY14" fmla="*/ 3930520 h 4091282"/>
+                <a:gd name="connsiteX15" fmla="*/ 637829 w 4108426"/>
+                <a:gd name="connsiteY15" fmla="*/ 3510795 h 4091282"/>
+                <a:gd name="connsiteX16" fmla="*/ 435461 w 4108426"/>
+                <a:gd name="connsiteY16" fmla="*/ 3458330 h 4091282"/>
+                <a:gd name="connsiteX17" fmla="*/ 105678 w 4108426"/>
+                <a:gd name="connsiteY17" fmla="*/ 3360894 h 4091282"/>
+                <a:gd name="connsiteX18" fmla="*/ 8242 w 4108426"/>
+                <a:gd name="connsiteY18" fmla="*/ 3053595 h 4091282"/>
+                <a:gd name="connsiteX19" fmla="*/ 285560 w 4108426"/>
+                <a:gd name="connsiteY19" fmla="*/ 2731307 h 4091282"/>
+                <a:gd name="connsiteX20" fmla="*/ 727770 w 4108426"/>
+                <a:gd name="connsiteY20" fmla="*/ 2731307 h 4091282"/>
+                <a:gd name="connsiteX21" fmla="*/ 840196 w 4108426"/>
+                <a:gd name="connsiteY21" fmla="*/ 2656356 h 4091282"/>
+                <a:gd name="connsiteX0" fmla="*/ 1035068 w 4108426"/>
+                <a:gd name="connsiteY0" fmla="*/ 2424008 h 4091282"/>
+                <a:gd name="connsiteX1" fmla="*/ 2489114 w 4108426"/>
+                <a:gd name="connsiteY1" fmla="*/ 924992 h 4091282"/>
+                <a:gd name="connsiteX2" fmla="*/ 2683986 w 4108426"/>
+                <a:gd name="connsiteY2" fmla="*/ 3097 h 4091282"/>
+                <a:gd name="connsiteX3" fmla="*/ 3246117 w 4108426"/>
+                <a:gd name="connsiteY3" fmla="*/ 625189 h 4091282"/>
+                <a:gd name="connsiteX4" fmla="*/ 3673337 w 4108426"/>
+                <a:gd name="connsiteY4" fmla="*/ 617694 h 4091282"/>
+                <a:gd name="connsiteX5" fmla="*/ 4108052 w 4108426"/>
+                <a:gd name="connsiteY5" fmla="*/ 1119864 h 4091282"/>
+                <a:gd name="connsiteX6" fmla="*/ 3598386 w 4108426"/>
+                <a:gd name="connsiteY6" fmla="*/ 1532094 h 4091282"/>
+                <a:gd name="connsiteX7" fmla="*/ 2998779 w 4108426"/>
+                <a:gd name="connsiteY7" fmla="*/ 1367202 h 4091282"/>
+                <a:gd name="connsiteX8" fmla="*/ 2751442 w 4108426"/>
+                <a:gd name="connsiteY8" fmla="*/ 1457143 h 4091282"/>
+                <a:gd name="connsiteX9" fmla="*/ 1739606 w 4108426"/>
+                <a:gd name="connsiteY9" fmla="*/ 2453989 h 4091282"/>
+                <a:gd name="connsiteX10" fmla="*/ 1319881 w 4108426"/>
+                <a:gd name="connsiteY10" fmla="*/ 3016120 h 4091282"/>
+                <a:gd name="connsiteX11" fmla="*/ 1274911 w 4108426"/>
+                <a:gd name="connsiteY11" fmla="*/ 3323418 h 4091282"/>
+                <a:gd name="connsiteX12" fmla="*/ 1394832 w 4108426"/>
+                <a:gd name="connsiteY12" fmla="*/ 3803104 h 4091282"/>
+                <a:gd name="connsiteX13" fmla="*/ 1207455 w 4108426"/>
+                <a:gd name="connsiteY13" fmla="*/ 4087917 h 4091282"/>
+                <a:gd name="connsiteX14" fmla="*/ 847691 w 4108426"/>
+                <a:gd name="connsiteY14" fmla="*/ 3930520 h 4091282"/>
+                <a:gd name="connsiteX15" fmla="*/ 637829 w 4108426"/>
+                <a:gd name="connsiteY15" fmla="*/ 3510795 h 4091282"/>
+                <a:gd name="connsiteX16" fmla="*/ 435461 w 4108426"/>
+                <a:gd name="connsiteY16" fmla="*/ 3458330 h 4091282"/>
+                <a:gd name="connsiteX17" fmla="*/ 105678 w 4108426"/>
+                <a:gd name="connsiteY17" fmla="*/ 3360894 h 4091282"/>
+                <a:gd name="connsiteX18" fmla="*/ 8242 w 4108426"/>
+                <a:gd name="connsiteY18" fmla="*/ 3053595 h 4091282"/>
+                <a:gd name="connsiteX19" fmla="*/ 285560 w 4108426"/>
+                <a:gd name="connsiteY19" fmla="*/ 2731307 h 4091282"/>
+                <a:gd name="connsiteX20" fmla="*/ 727770 w 4108426"/>
+                <a:gd name="connsiteY20" fmla="*/ 2731307 h 4091282"/>
+                <a:gd name="connsiteX21" fmla="*/ 1035068 w 4108426"/>
+                <a:gd name="connsiteY21" fmla="*/ 2424008 h 4091282"/>
+                <a:gd name="connsiteX0" fmla="*/ 1035068 w 4108426"/>
+                <a:gd name="connsiteY0" fmla="*/ 2424008 h 4091282"/>
+                <a:gd name="connsiteX1" fmla="*/ 2489114 w 4108426"/>
+                <a:gd name="connsiteY1" fmla="*/ 924992 h 4091282"/>
+                <a:gd name="connsiteX2" fmla="*/ 2683986 w 4108426"/>
+                <a:gd name="connsiteY2" fmla="*/ 3097 h 4091282"/>
+                <a:gd name="connsiteX3" fmla="*/ 3246117 w 4108426"/>
+                <a:gd name="connsiteY3" fmla="*/ 625189 h 4091282"/>
+                <a:gd name="connsiteX4" fmla="*/ 3673337 w 4108426"/>
+                <a:gd name="connsiteY4" fmla="*/ 617694 h 4091282"/>
+                <a:gd name="connsiteX5" fmla="*/ 4108052 w 4108426"/>
+                <a:gd name="connsiteY5" fmla="*/ 1119864 h 4091282"/>
+                <a:gd name="connsiteX6" fmla="*/ 3598386 w 4108426"/>
+                <a:gd name="connsiteY6" fmla="*/ 1532094 h 4091282"/>
+                <a:gd name="connsiteX7" fmla="*/ 2998779 w 4108426"/>
+                <a:gd name="connsiteY7" fmla="*/ 1367202 h 4091282"/>
+                <a:gd name="connsiteX8" fmla="*/ 2751442 w 4108426"/>
+                <a:gd name="connsiteY8" fmla="*/ 1457143 h 4091282"/>
+                <a:gd name="connsiteX9" fmla="*/ 1739606 w 4108426"/>
+                <a:gd name="connsiteY9" fmla="*/ 2453989 h 4091282"/>
+                <a:gd name="connsiteX10" fmla="*/ 1319881 w 4108426"/>
+                <a:gd name="connsiteY10" fmla="*/ 3016120 h 4091282"/>
+                <a:gd name="connsiteX11" fmla="*/ 1274911 w 4108426"/>
+                <a:gd name="connsiteY11" fmla="*/ 3323418 h 4091282"/>
+                <a:gd name="connsiteX12" fmla="*/ 1394832 w 4108426"/>
+                <a:gd name="connsiteY12" fmla="*/ 3803104 h 4091282"/>
+                <a:gd name="connsiteX13" fmla="*/ 1207455 w 4108426"/>
+                <a:gd name="connsiteY13" fmla="*/ 4087917 h 4091282"/>
+                <a:gd name="connsiteX14" fmla="*/ 847691 w 4108426"/>
+                <a:gd name="connsiteY14" fmla="*/ 3930520 h 4091282"/>
+                <a:gd name="connsiteX15" fmla="*/ 637829 w 4108426"/>
+                <a:gd name="connsiteY15" fmla="*/ 3510795 h 4091282"/>
+                <a:gd name="connsiteX16" fmla="*/ 435461 w 4108426"/>
+                <a:gd name="connsiteY16" fmla="*/ 3458330 h 4091282"/>
+                <a:gd name="connsiteX17" fmla="*/ 105678 w 4108426"/>
+                <a:gd name="connsiteY17" fmla="*/ 3360894 h 4091282"/>
+                <a:gd name="connsiteX18" fmla="*/ 8242 w 4108426"/>
+                <a:gd name="connsiteY18" fmla="*/ 3053595 h 4091282"/>
+                <a:gd name="connsiteX19" fmla="*/ 285560 w 4108426"/>
+                <a:gd name="connsiteY19" fmla="*/ 2731307 h 4091282"/>
+                <a:gd name="connsiteX20" fmla="*/ 1035068 w 4108426"/>
+                <a:gd name="connsiteY20" fmla="*/ 2424008 h 4091282"/>
+                <a:gd name="connsiteX0" fmla="*/ 1035068 w 4108426"/>
+                <a:gd name="connsiteY0" fmla="*/ 2441590 h 4108864"/>
+                <a:gd name="connsiteX1" fmla="*/ 2489114 w 4108426"/>
+                <a:gd name="connsiteY1" fmla="*/ 942574 h 4108864"/>
+                <a:gd name="connsiteX2" fmla="*/ 2683986 w 4108426"/>
+                <a:gd name="connsiteY2" fmla="*/ 20679 h 4108864"/>
+                <a:gd name="connsiteX3" fmla="*/ 2991284 w 4108426"/>
+                <a:gd name="connsiteY3" fmla="*/ 327977 h 4108864"/>
+                <a:gd name="connsiteX4" fmla="*/ 3246117 w 4108426"/>
+                <a:gd name="connsiteY4" fmla="*/ 642771 h 4108864"/>
+                <a:gd name="connsiteX5" fmla="*/ 3673337 w 4108426"/>
+                <a:gd name="connsiteY5" fmla="*/ 635276 h 4108864"/>
+                <a:gd name="connsiteX6" fmla="*/ 4108052 w 4108426"/>
+                <a:gd name="connsiteY6" fmla="*/ 1137446 h 4108864"/>
+                <a:gd name="connsiteX7" fmla="*/ 3598386 w 4108426"/>
+                <a:gd name="connsiteY7" fmla="*/ 1549676 h 4108864"/>
+                <a:gd name="connsiteX8" fmla="*/ 2998779 w 4108426"/>
+                <a:gd name="connsiteY8" fmla="*/ 1384784 h 4108864"/>
+                <a:gd name="connsiteX9" fmla="*/ 2751442 w 4108426"/>
+                <a:gd name="connsiteY9" fmla="*/ 1474725 h 4108864"/>
+                <a:gd name="connsiteX10" fmla="*/ 1739606 w 4108426"/>
+                <a:gd name="connsiteY10" fmla="*/ 2471571 h 4108864"/>
+                <a:gd name="connsiteX11" fmla="*/ 1319881 w 4108426"/>
+                <a:gd name="connsiteY11" fmla="*/ 3033702 h 4108864"/>
+                <a:gd name="connsiteX12" fmla="*/ 1274911 w 4108426"/>
+                <a:gd name="connsiteY12" fmla="*/ 3341000 h 4108864"/>
+                <a:gd name="connsiteX13" fmla="*/ 1394832 w 4108426"/>
+                <a:gd name="connsiteY13" fmla="*/ 3820686 h 4108864"/>
+                <a:gd name="connsiteX14" fmla="*/ 1207455 w 4108426"/>
+                <a:gd name="connsiteY14" fmla="*/ 4105499 h 4108864"/>
+                <a:gd name="connsiteX15" fmla="*/ 847691 w 4108426"/>
+                <a:gd name="connsiteY15" fmla="*/ 3948102 h 4108864"/>
+                <a:gd name="connsiteX16" fmla="*/ 637829 w 4108426"/>
+                <a:gd name="connsiteY16" fmla="*/ 3528377 h 4108864"/>
+                <a:gd name="connsiteX17" fmla="*/ 435461 w 4108426"/>
+                <a:gd name="connsiteY17" fmla="*/ 3475912 h 4108864"/>
+                <a:gd name="connsiteX18" fmla="*/ 105678 w 4108426"/>
+                <a:gd name="connsiteY18" fmla="*/ 3378476 h 4108864"/>
+                <a:gd name="connsiteX19" fmla="*/ 8242 w 4108426"/>
+                <a:gd name="connsiteY19" fmla="*/ 3071177 h 4108864"/>
+                <a:gd name="connsiteX20" fmla="*/ 285560 w 4108426"/>
+                <a:gd name="connsiteY20" fmla="*/ 2748889 h 4108864"/>
+                <a:gd name="connsiteX21" fmla="*/ 1035068 w 4108426"/>
+                <a:gd name="connsiteY21" fmla="*/ 2441590 h 4108864"/>
+                <a:gd name="connsiteX0" fmla="*/ 1035068 w 4108426"/>
+                <a:gd name="connsiteY0" fmla="*/ 2466350 h 4133624"/>
+                <a:gd name="connsiteX1" fmla="*/ 2489114 w 4108426"/>
+                <a:gd name="connsiteY1" fmla="*/ 967334 h 4133624"/>
+                <a:gd name="connsiteX2" fmla="*/ 2683986 w 4108426"/>
+                <a:gd name="connsiteY2" fmla="*/ 45439 h 4133624"/>
+                <a:gd name="connsiteX3" fmla="*/ 3036254 w 4108426"/>
+                <a:gd name="connsiteY3" fmla="*/ 195340 h 4133624"/>
+                <a:gd name="connsiteX4" fmla="*/ 3246117 w 4108426"/>
+                <a:gd name="connsiteY4" fmla="*/ 667531 h 4133624"/>
+                <a:gd name="connsiteX5" fmla="*/ 3673337 w 4108426"/>
+                <a:gd name="connsiteY5" fmla="*/ 660036 h 4133624"/>
+                <a:gd name="connsiteX6" fmla="*/ 4108052 w 4108426"/>
+                <a:gd name="connsiteY6" fmla="*/ 1162206 h 4133624"/>
+                <a:gd name="connsiteX7" fmla="*/ 3598386 w 4108426"/>
+                <a:gd name="connsiteY7" fmla="*/ 1574436 h 4133624"/>
+                <a:gd name="connsiteX8" fmla="*/ 2998779 w 4108426"/>
+                <a:gd name="connsiteY8" fmla="*/ 1409544 h 4133624"/>
+                <a:gd name="connsiteX9" fmla="*/ 2751442 w 4108426"/>
+                <a:gd name="connsiteY9" fmla="*/ 1499485 h 4133624"/>
+                <a:gd name="connsiteX10" fmla="*/ 1739606 w 4108426"/>
+                <a:gd name="connsiteY10" fmla="*/ 2496331 h 4133624"/>
+                <a:gd name="connsiteX11" fmla="*/ 1319881 w 4108426"/>
+                <a:gd name="connsiteY11" fmla="*/ 3058462 h 4133624"/>
+                <a:gd name="connsiteX12" fmla="*/ 1274911 w 4108426"/>
+                <a:gd name="connsiteY12" fmla="*/ 3365760 h 4133624"/>
+                <a:gd name="connsiteX13" fmla="*/ 1394832 w 4108426"/>
+                <a:gd name="connsiteY13" fmla="*/ 3845446 h 4133624"/>
+                <a:gd name="connsiteX14" fmla="*/ 1207455 w 4108426"/>
+                <a:gd name="connsiteY14" fmla="*/ 4130259 h 4133624"/>
+                <a:gd name="connsiteX15" fmla="*/ 847691 w 4108426"/>
+                <a:gd name="connsiteY15" fmla="*/ 3972862 h 4133624"/>
+                <a:gd name="connsiteX16" fmla="*/ 637829 w 4108426"/>
+                <a:gd name="connsiteY16" fmla="*/ 3553137 h 4133624"/>
+                <a:gd name="connsiteX17" fmla="*/ 435461 w 4108426"/>
+                <a:gd name="connsiteY17" fmla="*/ 3500672 h 4133624"/>
+                <a:gd name="connsiteX18" fmla="*/ 105678 w 4108426"/>
+                <a:gd name="connsiteY18" fmla="*/ 3403236 h 4133624"/>
+                <a:gd name="connsiteX19" fmla="*/ 8242 w 4108426"/>
+                <a:gd name="connsiteY19" fmla="*/ 3095937 h 4133624"/>
+                <a:gd name="connsiteX20" fmla="*/ 285560 w 4108426"/>
+                <a:gd name="connsiteY20" fmla="*/ 2773649 h 4133624"/>
+                <a:gd name="connsiteX21" fmla="*/ 1035068 w 4108426"/>
+                <a:gd name="connsiteY21" fmla="*/ 2466350 h 4133624"/>
+                <a:gd name="connsiteX0" fmla="*/ 1035068 w 4108426"/>
+                <a:gd name="connsiteY0" fmla="*/ 2433137 h 4100411"/>
+                <a:gd name="connsiteX1" fmla="*/ 2489114 w 4108426"/>
+                <a:gd name="connsiteY1" fmla="*/ 934121 h 4100411"/>
+                <a:gd name="connsiteX2" fmla="*/ 2646511 w 4108426"/>
+                <a:gd name="connsiteY2" fmla="*/ 439446 h 4100411"/>
+                <a:gd name="connsiteX3" fmla="*/ 2683986 w 4108426"/>
+                <a:gd name="connsiteY3" fmla="*/ 12226 h 4100411"/>
+                <a:gd name="connsiteX4" fmla="*/ 3036254 w 4108426"/>
+                <a:gd name="connsiteY4" fmla="*/ 162127 h 4100411"/>
+                <a:gd name="connsiteX5" fmla="*/ 3246117 w 4108426"/>
+                <a:gd name="connsiteY5" fmla="*/ 634318 h 4100411"/>
+                <a:gd name="connsiteX6" fmla="*/ 3673337 w 4108426"/>
+                <a:gd name="connsiteY6" fmla="*/ 626823 h 4100411"/>
+                <a:gd name="connsiteX7" fmla="*/ 4108052 w 4108426"/>
+                <a:gd name="connsiteY7" fmla="*/ 1128993 h 4100411"/>
+                <a:gd name="connsiteX8" fmla="*/ 3598386 w 4108426"/>
+                <a:gd name="connsiteY8" fmla="*/ 1541223 h 4100411"/>
+                <a:gd name="connsiteX9" fmla="*/ 2998779 w 4108426"/>
+                <a:gd name="connsiteY9" fmla="*/ 1376331 h 4100411"/>
+                <a:gd name="connsiteX10" fmla="*/ 2751442 w 4108426"/>
+                <a:gd name="connsiteY10" fmla="*/ 1466272 h 4100411"/>
+                <a:gd name="connsiteX11" fmla="*/ 1739606 w 4108426"/>
+                <a:gd name="connsiteY11" fmla="*/ 2463118 h 4100411"/>
+                <a:gd name="connsiteX12" fmla="*/ 1319881 w 4108426"/>
+                <a:gd name="connsiteY12" fmla="*/ 3025249 h 4100411"/>
+                <a:gd name="connsiteX13" fmla="*/ 1274911 w 4108426"/>
+                <a:gd name="connsiteY13" fmla="*/ 3332547 h 4100411"/>
+                <a:gd name="connsiteX14" fmla="*/ 1394832 w 4108426"/>
+                <a:gd name="connsiteY14" fmla="*/ 3812233 h 4100411"/>
+                <a:gd name="connsiteX15" fmla="*/ 1207455 w 4108426"/>
+                <a:gd name="connsiteY15" fmla="*/ 4097046 h 4100411"/>
+                <a:gd name="connsiteX16" fmla="*/ 847691 w 4108426"/>
+                <a:gd name="connsiteY16" fmla="*/ 3939649 h 4100411"/>
+                <a:gd name="connsiteX17" fmla="*/ 637829 w 4108426"/>
+                <a:gd name="connsiteY17" fmla="*/ 3519924 h 4100411"/>
+                <a:gd name="connsiteX18" fmla="*/ 435461 w 4108426"/>
+                <a:gd name="connsiteY18" fmla="*/ 3467459 h 4100411"/>
+                <a:gd name="connsiteX19" fmla="*/ 105678 w 4108426"/>
+                <a:gd name="connsiteY19" fmla="*/ 3370023 h 4100411"/>
+                <a:gd name="connsiteX20" fmla="*/ 8242 w 4108426"/>
+                <a:gd name="connsiteY20" fmla="*/ 3062724 h 4100411"/>
+                <a:gd name="connsiteX21" fmla="*/ 285560 w 4108426"/>
+                <a:gd name="connsiteY21" fmla="*/ 2740436 h 4100411"/>
+                <a:gd name="connsiteX22" fmla="*/ 1035068 w 4108426"/>
+                <a:gd name="connsiteY22" fmla="*/ 2433137 h 4100411"/>
+                <a:gd name="connsiteX0" fmla="*/ 1035068 w 4108426"/>
+                <a:gd name="connsiteY0" fmla="*/ 2433593 h 4100867"/>
+                <a:gd name="connsiteX1" fmla="*/ 2489114 w 4108426"/>
+                <a:gd name="connsiteY1" fmla="*/ 934577 h 4100867"/>
+                <a:gd name="connsiteX2" fmla="*/ 2564065 w 4108426"/>
+                <a:gd name="connsiteY2" fmla="*/ 447397 h 4100867"/>
+                <a:gd name="connsiteX3" fmla="*/ 2683986 w 4108426"/>
+                <a:gd name="connsiteY3" fmla="*/ 12682 h 4100867"/>
+                <a:gd name="connsiteX4" fmla="*/ 3036254 w 4108426"/>
+                <a:gd name="connsiteY4" fmla="*/ 162583 h 4100867"/>
+                <a:gd name="connsiteX5" fmla="*/ 3246117 w 4108426"/>
+                <a:gd name="connsiteY5" fmla="*/ 634774 h 4100867"/>
+                <a:gd name="connsiteX6" fmla="*/ 3673337 w 4108426"/>
+                <a:gd name="connsiteY6" fmla="*/ 627279 h 4100867"/>
+                <a:gd name="connsiteX7" fmla="*/ 4108052 w 4108426"/>
+                <a:gd name="connsiteY7" fmla="*/ 1129449 h 4100867"/>
+                <a:gd name="connsiteX8" fmla="*/ 3598386 w 4108426"/>
+                <a:gd name="connsiteY8" fmla="*/ 1541679 h 4100867"/>
+                <a:gd name="connsiteX9" fmla="*/ 2998779 w 4108426"/>
+                <a:gd name="connsiteY9" fmla="*/ 1376787 h 4100867"/>
+                <a:gd name="connsiteX10" fmla="*/ 2751442 w 4108426"/>
+                <a:gd name="connsiteY10" fmla="*/ 1466728 h 4100867"/>
+                <a:gd name="connsiteX11" fmla="*/ 1739606 w 4108426"/>
+                <a:gd name="connsiteY11" fmla="*/ 2463574 h 4100867"/>
+                <a:gd name="connsiteX12" fmla="*/ 1319881 w 4108426"/>
+                <a:gd name="connsiteY12" fmla="*/ 3025705 h 4100867"/>
+                <a:gd name="connsiteX13" fmla="*/ 1274911 w 4108426"/>
+                <a:gd name="connsiteY13" fmla="*/ 3333003 h 4100867"/>
+                <a:gd name="connsiteX14" fmla="*/ 1394832 w 4108426"/>
+                <a:gd name="connsiteY14" fmla="*/ 3812689 h 4100867"/>
+                <a:gd name="connsiteX15" fmla="*/ 1207455 w 4108426"/>
+                <a:gd name="connsiteY15" fmla="*/ 4097502 h 4100867"/>
+                <a:gd name="connsiteX16" fmla="*/ 847691 w 4108426"/>
+                <a:gd name="connsiteY16" fmla="*/ 3940105 h 4100867"/>
+                <a:gd name="connsiteX17" fmla="*/ 637829 w 4108426"/>
+                <a:gd name="connsiteY17" fmla="*/ 3520380 h 4100867"/>
+                <a:gd name="connsiteX18" fmla="*/ 435461 w 4108426"/>
+                <a:gd name="connsiteY18" fmla="*/ 3467915 h 4100867"/>
+                <a:gd name="connsiteX19" fmla="*/ 105678 w 4108426"/>
+                <a:gd name="connsiteY19" fmla="*/ 3370479 h 4100867"/>
+                <a:gd name="connsiteX20" fmla="*/ 8242 w 4108426"/>
+                <a:gd name="connsiteY20" fmla="*/ 3063180 h 4100867"/>
+                <a:gd name="connsiteX21" fmla="*/ 285560 w 4108426"/>
+                <a:gd name="connsiteY21" fmla="*/ 2740892 h 4100867"/>
+                <a:gd name="connsiteX22" fmla="*/ 1035068 w 4108426"/>
+                <a:gd name="connsiteY22" fmla="*/ 2433593 h 4100867"/>
+                <a:gd name="connsiteX0" fmla="*/ 1035068 w 4108426"/>
+                <a:gd name="connsiteY0" fmla="*/ 2433593 h 4100867"/>
+                <a:gd name="connsiteX1" fmla="*/ 2489114 w 4108426"/>
+                <a:gd name="connsiteY1" fmla="*/ 934577 h 4100867"/>
+                <a:gd name="connsiteX2" fmla="*/ 2564065 w 4108426"/>
+                <a:gd name="connsiteY2" fmla="*/ 447397 h 4100867"/>
+                <a:gd name="connsiteX3" fmla="*/ 2683986 w 4108426"/>
+                <a:gd name="connsiteY3" fmla="*/ 12682 h 4100867"/>
+                <a:gd name="connsiteX4" fmla="*/ 3036254 w 4108426"/>
+                <a:gd name="connsiteY4" fmla="*/ 162583 h 4100867"/>
+                <a:gd name="connsiteX5" fmla="*/ 3246117 w 4108426"/>
+                <a:gd name="connsiteY5" fmla="*/ 634774 h 4100867"/>
+                <a:gd name="connsiteX6" fmla="*/ 3673337 w 4108426"/>
+                <a:gd name="connsiteY6" fmla="*/ 627279 h 4100867"/>
+                <a:gd name="connsiteX7" fmla="*/ 4108052 w 4108426"/>
+                <a:gd name="connsiteY7" fmla="*/ 1129449 h 4100867"/>
+                <a:gd name="connsiteX8" fmla="*/ 3598386 w 4108426"/>
+                <a:gd name="connsiteY8" fmla="*/ 1541679 h 4100867"/>
+                <a:gd name="connsiteX9" fmla="*/ 2998779 w 4108426"/>
+                <a:gd name="connsiteY9" fmla="*/ 1376787 h 4100867"/>
+                <a:gd name="connsiteX10" fmla="*/ 2751442 w 4108426"/>
+                <a:gd name="connsiteY10" fmla="*/ 1466728 h 4100867"/>
+                <a:gd name="connsiteX11" fmla="*/ 1739606 w 4108426"/>
+                <a:gd name="connsiteY11" fmla="*/ 2463574 h 4100867"/>
+                <a:gd name="connsiteX12" fmla="*/ 1319881 w 4108426"/>
+                <a:gd name="connsiteY12" fmla="*/ 3025705 h 4100867"/>
+                <a:gd name="connsiteX13" fmla="*/ 1274911 w 4108426"/>
+                <a:gd name="connsiteY13" fmla="*/ 3333003 h 4100867"/>
+                <a:gd name="connsiteX14" fmla="*/ 1394832 w 4108426"/>
+                <a:gd name="connsiteY14" fmla="*/ 3812689 h 4100867"/>
+                <a:gd name="connsiteX15" fmla="*/ 1207455 w 4108426"/>
+                <a:gd name="connsiteY15" fmla="*/ 4097502 h 4100867"/>
+                <a:gd name="connsiteX16" fmla="*/ 847691 w 4108426"/>
+                <a:gd name="connsiteY16" fmla="*/ 3940105 h 4100867"/>
+                <a:gd name="connsiteX17" fmla="*/ 637829 w 4108426"/>
+                <a:gd name="connsiteY17" fmla="*/ 3520380 h 4100867"/>
+                <a:gd name="connsiteX18" fmla="*/ 435461 w 4108426"/>
+                <a:gd name="connsiteY18" fmla="*/ 3467915 h 4100867"/>
+                <a:gd name="connsiteX19" fmla="*/ 105678 w 4108426"/>
+                <a:gd name="connsiteY19" fmla="*/ 3370479 h 4100867"/>
+                <a:gd name="connsiteX20" fmla="*/ 8242 w 4108426"/>
+                <a:gd name="connsiteY20" fmla="*/ 3063180 h 4100867"/>
+                <a:gd name="connsiteX21" fmla="*/ 285560 w 4108426"/>
+                <a:gd name="connsiteY21" fmla="*/ 2740892 h 4100867"/>
+                <a:gd name="connsiteX22" fmla="*/ 1035068 w 4108426"/>
+                <a:gd name="connsiteY22" fmla="*/ 2433593 h 4100867"/>
+                <a:gd name="connsiteX0" fmla="*/ 1035068 w 4108426"/>
+                <a:gd name="connsiteY0" fmla="*/ 2433593 h 4100867"/>
+                <a:gd name="connsiteX1" fmla="*/ 2489114 w 4108426"/>
+                <a:gd name="connsiteY1" fmla="*/ 934577 h 4100867"/>
+                <a:gd name="connsiteX2" fmla="*/ 2564065 w 4108426"/>
+                <a:gd name="connsiteY2" fmla="*/ 447397 h 4100867"/>
+                <a:gd name="connsiteX3" fmla="*/ 2683986 w 4108426"/>
+                <a:gd name="connsiteY3" fmla="*/ 12682 h 4100867"/>
+                <a:gd name="connsiteX4" fmla="*/ 3036254 w 4108426"/>
+                <a:gd name="connsiteY4" fmla="*/ 162583 h 4100867"/>
+                <a:gd name="connsiteX5" fmla="*/ 3246117 w 4108426"/>
+                <a:gd name="connsiteY5" fmla="*/ 634774 h 4100867"/>
+                <a:gd name="connsiteX6" fmla="*/ 3673337 w 4108426"/>
+                <a:gd name="connsiteY6" fmla="*/ 627279 h 4100867"/>
+                <a:gd name="connsiteX7" fmla="*/ 4108052 w 4108426"/>
+                <a:gd name="connsiteY7" fmla="*/ 1129449 h 4100867"/>
+                <a:gd name="connsiteX8" fmla="*/ 3598386 w 4108426"/>
+                <a:gd name="connsiteY8" fmla="*/ 1541679 h 4100867"/>
+                <a:gd name="connsiteX9" fmla="*/ 2998779 w 4108426"/>
+                <a:gd name="connsiteY9" fmla="*/ 1376787 h 4100867"/>
+                <a:gd name="connsiteX10" fmla="*/ 2751442 w 4108426"/>
+                <a:gd name="connsiteY10" fmla="*/ 1466728 h 4100867"/>
+                <a:gd name="connsiteX11" fmla="*/ 1739606 w 4108426"/>
+                <a:gd name="connsiteY11" fmla="*/ 2463574 h 4100867"/>
+                <a:gd name="connsiteX12" fmla="*/ 1319881 w 4108426"/>
+                <a:gd name="connsiteY12" fmla="*/ 3025705 h 4100867"/>
+                <a:gd name="connsiteX13" fmla="*/ 1274911 w 4108426"/>
+                <a:gd name="connsiteY13" fmla="*/ 3333003 h 4100867"/>
+                <a:gd name="connsiteX14" fmla="*/ 1394832 w 4108426"/>
+                <a:gd name="connsiteY14" fmla="*/ 3812689 h 4100867"/>
+                <a:gd name="connsiteX15" fmla="*/ 1207455 w 4108426"/>
+                <a:gd name="connsiteY15" fmla="*/ 4097502 h 4100867"/>
+                <a:gd name="connsiteX16" fmla="*/ 847691 w 4108426"/>
+                <a:gd name="connsiteY16" fmla="*/ 3940105 h 4100867"/>
+                <a:gd name="connsiteX17" fmla="*/ 637829 w 4108426"/>
+                <a:gd name="connsiteY17" fmla="*/ 3520380 h 4100867"/>
+                <a:gd name="connsiteX18" fmla="*/ 435461 w 4108426"/>
+                <a:gd name="connsiteY18" fmla="*/ 3467915 h 4100867"/>
+                <a:gd name="connsiteX19" fmla="*/ 105678 w 4108426"/>
+                <a:gd name="connsiteY19" fmla="*/ 3370479 h 4100867"/>
+                <a:gd name="connsiteX20" fmla="*/ 8242 w 4108426"/>
+                <a:gd name="connsiteY20" fmla="*/ 3063180 h 4100867"/>
+                <a:gd name="connsiteX21" fmla="*/ 285560 w 4108426"/>
+                <a:gd name="connsiteY21" fmla="*/ 2740892 h 4100867"/>
+                <a:gd name="connsiteX22" fmla="*/ 1035068 w 4108426"/>
+                <a:gd name="connsiteY22" fmla="*/ 2433593 h 4100867"/>
+                <a:gd name="connsiteX0" fmla="*/ 1035068 w 4118434"/>
+                <a:gd name="connsiteY0" fmla="*/ 2433593 h 4100867"/>
+                <a:gd name="connsiteX1" fmla="*/ 2489114 w 4118434"/>
+                <a:gd name="connsiteY1" fmla="*/ 934577 h 4100867"/>
+                <a:gd name="connsiteX2" fmla="*/ 2564065 w 4118434"/>
+                <a:gd name="connsiteY2" fmla="*/ 447397 h 4100867"/>
+                <a:gd name="connsiteX3" fmla="*/ 2683986 w 4118434"/>
+                <a:gd name="connsiteY3" fmla="*/ 12682 h 4100867"/>
+                <a:gd name="connsiteX4" fmla="*/ 3036254 w 4118434"/>
+                <a:gd name="connsiteY4" fmla="*/ 162583 h 4100867"/>
+                <a:gd name="connsiteX5" fmla="*/ 3246117 w 4118434"/>
+                <a:gd name="connsiteY5" fmla="*/ 634774 h 4100867"/>
+                <a:gd name="connsiteX6" fmla="*/ 3673337 w 4118434"/>
+                <a:gd name="connsiteY6" fmla="*/ 627279 h 4100867"/>
+                <a:gd name="connsiteX7" fmla="*/ 3920675 w 4118434"/>
+                <a:gd name="connsiteY7" fmla="*/ 829646 h 4100867"/>
+                <a:gd name="connsiteX8" fmla="*/ 4108052 w 4118434"/>
+                <a:gd name="connsiteY8" fmla="*/ 1129449 h 4100867"/>
+                <a:gd name="connsiteX9" fmla="*/ 3598386 w 4118434"/>
+                <a:gd name="connsiteY9" fmla="*/ 1541679 h 4100867"/>
+                <a:gd name="connsiteX10" fmla="*/ 2998779 w 4118434"/>
+                <a:gd name="connsiteY10" fmla="*/ 1376787 h 4100867"/>
+                <a:gd name="connsiteX11" fmla="*/ 2751442 w 4118434"/>
+                <a:gd name="connsiteY11" fmla="*/ 1466728 h 4100867"/>
+                <a:gd name="connsiteX12" fmla="*/ 1739606 w 4118434"/>
+                <a:gd name="connsiteY12" fmla="*/ 2463574 h 4100867"/>
+                <a:gd name="connsiteX13" fmla="*/ 1319881 w 4118434"/>
+                <a:gd name="connsiteY13" fmla="*/ 3025705 h 4100867"/>
+                <a:gd name="connsiteX14" fmla="*/ 1274911 w 4118434"/>
+                <a:gd name="connsiteY14" fmla="*/ 3333003 h 4100867"/>
+                <a:gd name="connsiteX15" fmla="*/ 1394832 w 4118434"/>
+                <a:gd name="connsiteY15" fmla="*/ 3812689 h 4100867"/>
+                <a:gd name="connsiteX16" fmla="*/ 1207455 w 4118434"/>
+                <a:gd name="connsiteY16" fmla="*/ 4097502 h 4100867"/>
+                <a:gd name="connsiteX17" fmla="*/ 847691 w 4118434"/>
+                <a:gd name="connsiteY17" fmla="*/ 3940105 h 4100867"/>
+                <a:gd name="connsiteX18" fmla="*/ 637829 w 4118434"/>
+                <a:gd name="connsiteY18" fmla="*/ 3520380 h 4100867"/>
+                <a:gd name="connsiteX19" fmla="*/ 435461 w 4118434"/>
+                <a:gd name="connsiteY19" fmla="*/ 3467915 h 4100867"/>
+                <a:gd name="connsiteX20" fmla="*/ 105678 w 4118434"/>
+                <a:gd name="connsiteY20" fmla="*/ 3370479 h 4100867"/>
+                <a:gd name="connsiteX21" fmla="*/ 8242 w 4118434"/>
+                <a:gd name="connsiteY21" fmla="*/ 3063180 h 4100867"/>
+                <a:gd name="connsiteX22" fmla="*/ 285560 w 4118434"/>
+                <a:gd name="connsiteY22" fmla="*/ 2740892 h 4100867"/>
+                <a:gd name="connsiteX23" fmla="*/ 1035068 w 4118434"/>
+                <a:gd name="connsiteY23" fmla="*/ 2433593 h 4100867"/>
+                <a:gd name="connsiteX0" fmla="*/ 1035068 w 4123871"/>
+                <a:gd name="connsiteY0" fmla="*/ 2433593 h 4100867"/>
+                <a:gd name="connsiteX1" fmla="*/ 2489114 w 4123871"/>
+                <a:gd name="connsiteY1" fmla="*/ 934577 h 4100867"/>
+                <a:gd name="connsiteX2" fmla="*/ 2564065 w 4123871"/>
+                <a:gd name="connsiteY2" fmla="*/ 447397 h 4100867"/>
+                <a:gd name="connsiteX3" fmla="*/ 2683986 w 4123871"/>
+                <a:gd name="connsiteY3" fmla="*/ 12682 h 4100867"/>
+                <a:gd name="connsiteX4" fmla="*/ 3036254 w 4123871"/>
+                <a:gd name="connsiteY4" fmla="*/ 162583 h 4100867"/>
+                <a:gd name="connsiteX5" fmla="*/ 3246117 w 4123871"/>
+                <a:gd name="connsiteY5" fmla="*/ 634774 h 4100867"/>
+                <a:gd name="connsiteX6" fmla="*/ 3673337 w 4123871"/>
+                <a:gd name="connsiteY6" fmla="*/ 627279 h 4100867"/>
+                <a:gd name="connsiteX7" fmla="*/ 3965645 w 4123871"/>
+                <a:gd name="connsiteY7" fmla="*/ 799666 h 4100867"/>
+                <a:gd name="connsiteX8" fmla="*/ 4108052 w 4123871"/>
+                <a:gd name="connsiteY8" fmla="*/ 1129449 h 4100867"/>
+                <a:gd name="connsiteX9" fmla="*/ 3598386 w 4123871"/>
+                <a:gd name="connsiteY9" fmla="*/ 1541679 h 4100867"/>
+                <a:gd name="connsiteX10" fmla="*/ 2998779 w 4123871"/>
+                <a:gd name="connsiteY10" fmla="*/ 1376787 h 4100867"/>
+                <a:gd name="connsiteX11" fmla="*/ 2751442 w 4123871"/>
+                <a:gd name="connsiteY11" fmla="*/ 1466728 h 4100867"/>
+                <a:gd name="connsiteX12" fmla="*/ 1739606 w 4123871"/>
+                <a:gd name="connsiteY12" fmla="*/ 2463574 h 4100867"/>
+                <a:gd name="connsiteX13" fmla="*/ 1319881 w 4123871"/>
+                <a:gd name="connsiteY13" fmla="*/ 3025705 h 4100867"/>
+                <a:gd name="connsiteX14" fmla="*/ 1274911 w 4123871"/>
+                <a:gd name="connsiteY14" fmla="*/ 3333003 h 4100867"/>
+                <a:gd name="connsiteX15" fmla="*/ 1394832 w 4123871"/>
+                <a:gd name="connsiteY15" fmla="*/ 3812689 h 4100867"/>
+                <a:gd name="connsiteX16" fmla="*/ 1207455 w 4123871"/>
+                <a:gd name="connsiteY16" fmla="*/ 4097502 h 4100867"/>
+                <a:gd name="connsiteX17" fmla="*/ 847691 w 4123871"/>
+                <a:gd name="connsiteY17" fmla="*/ 3940105 h 4100867"/>
+                <a:gd name="connsiteX18" fmla="*/ 637829 w 4123871"/>
+                <a:gd name="connsiteY18" fmla="*/ 3520380 h 4100867"/>
+                <a:gd name="connsiteX19" fmla="*/ 435461 w 4123871"/>
+                <a:gd name="connsiteY19" fmla="*/ 3467915 h 4100867"/>
+                <a:gd name="connsiteX20" fmla="*/ 105678 w 4123871"/>
+                <a:gd name="connsiteY20" fmla="*/ 3370479 h 4100867"/>
+                <a:gd name="connsiteX21" fmla="*/ 8242 w 4123871"/>
+                <a:gd name="connsiteY21" fmla="*/ 3063180 h 4100867"/>
+                <a:gd name="connsiteX22" fmla="*/ 285560 w 4123871"/>
+                <a:gd name="connsiteY22" fmla="*/ 2740892 h 4100867"/>
+                <a:gd name="connsiteX23" fmla="*/ 1035068 w 4123871"/>
+                <a:gd name="connsiteY23" fmla="*/ 2433593 h 4100867"/>
+                <a:gd name="connsiteX0" fmla="*/ 1035068 w 4109101"/>
+                <a:gd name="connsiteY0" fmla="*/ 2433593 h 4100867"/>
+                <a:gd name="connsiteX1" fmla="*/ 2489114 w 4109101"/>
+                <a:gd name="connsiteY1" fmla="*/ 934577 h 4100867"/>
+                <a:gd name="connsiteX2" fmla="*/ 2564065 w 4109101"/>
+                <a:gd name="connsiteY2" fmla="*/ 447397 h 4100867"/>
+                <a:gd name="connsiteX3" fmla="*/ 2683986 w 4109101"/>
+                <a:gd name="connsiteY3" fmla="*/ 12682 h 4100867"/>
+                <a:gd name="connsiteX4" fmla="*/ 3036254 w 4109101"/>
+                <a:gd name="connsiteY4" fmla="*/ 162583 h 4100867"/>
+                <a:gd name="connsiteX5" fmla="*/ 3246117 w 4109101"/>
+                <a:gd name="connsiteY5" fmla="*/ 634774 h 4100867"/>
+                <a:gd name="connsiteX6" fmla="*/ 3673337 w 4109101"/>
+                <a:gd name="connsiteY6" fmla="*/ 627279 h 4100867"/>
+                <a:gd name="connsiteX7" fmla="*/ 3965645 w 4109101"/>
+                <a:gd name="connsiteY7" fmla="*/ 799666 h 4100867"/>
+                <a:gd name="connsiteX8" fmla="*/ 4108052 w 4109101"/>
+                <a:gd name="connsiteY8" fmla="*/ 1129449 h 4100867"/>
+                <a:gd name="connsiteX9" fmla="*/ 3898189 w 4109101"/>
+                <a:gd name="connsiteY9" fmla="*/ 1376787 h 4100867"/>
+                <a:gd name="connsiteX10" fmla="*/ 3598386 w 4109101"/>
+                <a:gd name="connsiteY10" fmla="*/ 1541679 h 4100867"/>
+                <a:gd name="connsiteX11" fmla="*/ 2998779 w 4109101"/>
+                <a:gd name="connsiteY11" fmla="*/ 1376787 h 4100867"/>
+                <a:gd name="connsiteX12" fmla="*/ 2751442 w 4109101"/>
+                <a:gd name="connsiteY12" fmla="*/ 1466728 h 4100867"/>
+                <a:gd name="connsiteX13" fmla="*/ 1739606 w 4109101"/>
+                <a:gd name="connsiteY13" fmla="*/ 2463574 h 4100867"/>
+                <a:gd name="connsiteX14" fmla="*/ 1319881 w 4109101"/>
+                <a:gd name="connsiteY14" fmla="*/ 3025705 h 4100867"/>
+                <a:gd name="connsiteX15" fmla="*/ 1274911 w 4109101"/>
+                <a:gd name="connsiteY15" fmla="*/ 3333003 h 4100867"/>
+                <a:gd name="connsiteX16" fmla="*/ 1394832 w 4109101"/>
+                <a:gd name="connsiteY16" fmla="*/ 3812689 h 4100867"/>
+                <a:gd name="connsiteX17" fmla="*/ 1207455 w 4109101"/>
+                <a:gd name="connsiteY17" fmla="*/ 4097502 h 4100867"/>
+                <a:gd name="connsiteX18" fmla="*/ 847691 w 4109101"/>
+                <a:gd name="connsiteY18" fmla="*/ 3940105 h 4100867"/>
+                <a:gd name="connsiteX19" fmla="*/ 637829 w 4109101"/>
+                <a:gd name="connsiteY19" fmla="*/ 3520380 h 4100867"/>
+                <a:gd name="connsiteX20" fmla="*/ 435461 w 4109101"/>
+                <a:gd name="connsiteY20" fmla="*/ 3467915 h 4100867"/>
+                <a:gd name="connsiteX21" fmla="*/ 105678 w 4109101"/>
+                <a:gd name="connsiteY21" fmla="*/ 3370479 h 4100867"/>
+                <a:gd name="connsiteX22" fmla="*/ 8242 w 4109101"/>
+                <a:gd name="connsiteY22" fmla="*/ 3063180 h 4100867"/>
+                <a:gd name="connsiteX23" fmla="*/ 285560 w 4109101"/>
+                <a:gd name="connsiteY23" fmla="*/ 2740892 h 4100867"/>
+                <a:gd name="connsiteX24" fmla="*/ 1035068 w 4109101"/>
+                <a:gd name="connsiteY24" fmla="*/ 2433593 h 4100867"/>
+                <a:gd name="connsiteX0" fmla="*/ 1035068 w 4108288"/>
+                <a:gd name="connsiteY0" fmla="*/ 2433593 h 4100867"/>
+                <a:gd name="connsiteX1" fmla="*/ 2489114 w 4108288"/>
+                <a:gd name="connsiteY1" fmla="*/ 934577 h 4100867"/>
+                <a:gd name="connsiteX2" fmla="*/ 2564065 w 4108288"/>
+                <a:gd name="connsiteY2" fmla="*/ 447397 h 4100867"/>
+                <a:gd name="connsiteX3" fmla="*/ 2683986 w 4108288"/>
+                <a:gd name="connsiteY3" fmla="*/ 12682 h 4100867"/>
+                <a:gd name="connsiteX4" fmla="*/ 3036254 w 4108288"/>
+                <a:gd name="connsiteY4" fmla="*/ 162583 h 4100867"/>
+                <a:gd name="connsiteX5" fmla="*/ 3246117 w 4108288"/>
+                <a:gd name="connsiteY5" fmla="*/ 634774 h 4100867"/>
+                <a:gd name="connsiteX6" fmla="*/ 3673337 w 4108288"/>
+                <a:gd name="connsiteY6" fmla="*/ 627279 h 4100867"/>
+                <a:gd name="connsiteX7" fmla="*/ 3965645 w 4108288"/>
+                <a:gd name="connsiteY7" fmla="*/ 799666 h 4100867"/>
+                <a:gd name="connsiteX8" fmla="*/ 4108052 w 4108288"/>
+                <a:gd name="connsiteY8" fmla="*/ 1129449 h 4100867"/>
+                <a:gd name="connsiteX9" fmla="*/ 3935665 w 4108288"/>
+                <a:gd name="connsiteY9" fmla="*/ 1429252 h 4100867"/>
+                <a:gd name="connsiteX10" fmla="*/ 3598386 w 4108288"/>
+                <a:gd name="connsiteY10" fmla="*/ 1541679 h 4100867"/>
+                <a:gd name="connsiteX11" fmla="*/ 2998779 w 4108288"/>
+                <a:gd name="connsiteY11" fmla="*/ 1376787 h 4100867"/>
+                <a:gd name="connsiteX12" fmla="*/ 2751442 w 4108288"/>
+                <a:gd name="connsiteY12" fmla="*/ 1466728 h 4100867"/>
+                <a:gd name="connsiteX13" fmla="*/ 1739606 w 4108288"/>
+                <a:gd name="connsiteY13" fmla="*/ 2463574 h 4100867"/>
+                <a:gd name="connsiteX14" fmla="*/ 1319881 w 4108288"/>
+                <a:gd name="connsiteY14" fmla="*/ 3025705 h 4100867"/>
+                <a:gd name="connsiteX15" fmla="*/ 1274911 w 4108288"/>
+                <a:gd name="connsiteY15" fmla="*/ 3333003 h 4100867"/>
+                <a:gd name="connsiteX16" fmla="*/ 1394832 w 4108288"/>
+                <a:gd name="connsiteY16" fmla="*/ 3812689 h 4100867"/>
+                <a:gd name="connsiteX17" fmla="*/ 1207455 w 4108288"/>
+                <a:gd name="connsiteY17" fmla="*/ 4097502 h 4100867"/>
+                <a:gd name="connsiteX18" fmla="*/ 847691 w 4108288"/>
+                <a:gd name="connsiteY18" fmla="*/ 3940105 h 4100867"/>
+                <a:gd name="connsiteX19" fmla="*/ 637829 w 4108288"/>
+                <a:gd name="connsiteY19" fmla="*/ 3520380 h 4100867"/>
+                <a:gd name="connsiteX20" fmla="*/ 435461 w 4108288"/>
+                <a:gd name="connsiteY20" fmla="*/ 3467915 h 4100867"/>
+                <a:gd name="connsiteX21" fmla="*/ 105678 w 4108288"/>
+                <a:gd name="connsiteY21" fmla="*/ 3370479 h 4100867"/>
+                <a:gd name="connsiteX22" fmla="*/ 8242 w 4108288"/>
+                <a:gd name="connsiteY22" fmla="*/ 3063180 h 4100867"/>
+                <a:gd name="connsiteX23" fmla="*/ 285560 w 4108288"/>
+                <a:gd name="connsiteY23" fmla="*/ 2740892 h 4100867"/>
+                <a:gd name="connsiteX24" fmla="*/ 1035068 w 4108288"/>
+                <a:gd name="connsiteY24" fmla="*/ 2433593 h 4100867"/>
+                <a:gd name="connsiteX0" fmla="*/ 1035068 w 4108288"/>
+                <a:gd name="connsiteY0" fmla="*/ 2433593 h 4100867"/>
+                <a:gd name="connsiteX1" fmla="*/ 2489114 w 4108288"/>
+                <a:gd name="connsiteY1" fmla="*/ 934577 h 4100867"/>
+                <a:gd name="connsiteX2" fmla="*/ 2564065 w 4108288"/>
+                <a:gd name="connsiteY2" fmla="*/ 447397 h 4100867"/>
+                <a:gd name="connsiteX3" fmla="*/ 2683986 w 4108288"/>
+                <a:gd name="connsiteY3" fmla="*/ 12682 h 4100867"/>
+                <a:gd name="connsiteX4" fmla="*/ 3036254 w 4108288"/>
+                <a:gd name="connsiteY4" fmla="*/ 162583 h 4100867"/>
+                <a:gd name="connsiteX5" fmla="*/ 3246117 w 4108288"/>
+                <a:gd name="connsiteY5" fmla="*/ 634774 h 4100867"/>
+                <a:gd name="connsiteX6" fmla="*/ 3673337 w 4108288"/>
+                <a:gd name="connsiteY6" fmla="*/ 627279 h 4100867"/>
+                <a:gd name="connsiteX7" fmla="*/ 3965645 w 4108288"/>
+                <a:gd name="connsiteY7" fmla="*/ 799666 h 4100867"/>
+                <a:gd name="connsiteX8" fmla="*/ 4108052 w 4108288"/>
+                <a:gd name="connsiteY8" fmla="*/ 1129449 h 4100867"/>
+                <a:gd name="connsiteX9" fmla="*/ 3935665 w 4108288"/>
+                <a:gd name="connsiteY9" fmla="*/ 1429252 h 4100867"/>
+                <a:gd name="connsiteX10" fmla="*/ 3598386 w 4108288"/>
+                <a:gd name="connsiteY10" fmla="*/ 1541679 h 4100867"/>
+                <a:gd name="connsiteX11" fmla="*/ 3118700 w 4108288"/>
+                <a:gd name="connsiteY11" fmla="*/ 1421757 h 4100867"/>
+                <a:gd name="connsiteX12" fmla="*/ 2751442 w 4108288"/>
+                <a:gd name="connsiteY12" fmla="*/ 1466728 h 4100867"/>
+                <a:gd name="connsiteX13" fmla="*/ 1739606 w 4108288"/>
+                <a:gd name="connsiteY13" fmla="*/ 2463574 h 4100867"/>
+                <a:gd name="connsiteX14" fmla="*/ 1319881 w 4108288"/>
+                <a:gd name="connsiteY14" fmla="*/ 3025705 h 4100867"/>
+                <a:gd name="connsiteX15" fmla="*/ 1274911 w 4108288"/>
+                <a:gd name="connsiteY15" fmla="*/ 3333003 h 4100867"/>
+                <a:gd name="connsiteX16" fmla="*/ 1394832 w 4108288"/>
+                <a:gd name="connsiteY16" fmla="*/ 3812689 h 4100867"/>
+                <a:gd name="connsiteX17" fmla="*/ 1207455 w 4108288"/>
+                <a:gd name="connsiteY17" fmla="*/ 4097502 h 4100867"/>
+                <a:gd name="connsiteX18" fmla="*/ 847691 w 4108288"/>
+                <a:gd name="connsiteY18" fmla="*/ 3940105 h 4100867"/>
+                <a:gd name="connsiteX19" fmla="*/ 637829 w 4108288"/>
+                <a:gd name="connsiteY19" fmla="*/ 3520380 h 4100867"/>
+                <a:gd name="connsiteX20" fmla="*/ 435461 w 4108288"/>
+                <a:gd name="connsiteY20" fmla="*/ 3467915 h 4100867"/>
+                <a:gd name="connsiteX21" fmla="*/ 105678 w 4108288"/>
+                <a:gd name="connsiteY21" fmla="*/ 3370479 h 4100867"/>
+                <a:gd name="connsiteX22" fmla="*/ 8242 w 4108288"/>
+                <a:gd name="connsiteY22" fmla="*/ 3063180 h 4100867"/>
+                <a:gd name="connsiteX23" fmla="*/ 285560 w 4108288"/>
+                <a:gd name="connsiteY23" fmla="*/ 2740892 h 4100867"/>
+                <a:gd name="connsiteX24" fmla="*/ 1035068 w 4108288"/>
+                <a:gd name="connsiteY24" fmla="*/ 2433593 h 4100867"/>
+                <a:gd name="connsiteX0" fmla="*/ 1035068 w 4108288"/>
+                <a:gd name="connsiteY0" fmla="*/ 2433593 h 4100867"/>
+                <a:gd name="connsiteX1" fmla="*/ 1859527 w 4108288"/>
+                <a:gd name="connsiteY1" fmla="*/ 1646610 h 4100867"/>
+                <a:gd name="connsiteX2" fmla="*/ 2489114 w 4108288"/>
+                <a:gd name="connsiteY2" fmla="*/ 934577 h 4100867"/>
+                <a:gd name="connsiteX3" fmla="*/ 2564065 w 4108288"/>
+                <a:gd name="connsiteY3" fmla="*/ 447397 h 4100867"/>
+                <a:gd name="connsiteX4" fmla="*/ 2683986 w 4108288"/>
+                <a:gd name="connsiteY4" fmla="*/ 12682 h 4100867"/>
+                <a:gd name="connsiteX5" fmla="*/ 3036254 w 4108288"/>
+                <a:gd name="connsiteY5" fmla="*/ 162583 h 4100867"/>
+                <a:gd name="connsiteX6" fmla="*/ 3246117 w 4108288"/>
+                <a:gd name="connsiteY6" fmla="*/ 634774 h 4100867"/>
+                <a:gd name="connsiteX7" fmla="*/ 3673337 w 4108288"/>
+                <a:gd name="connsiteY7" fmla="*/ 627279 h 4100867"/>
+                <a:gd name="connsiteX8" fmla="*/ 3965645 w 4108288"/>
+                <a:gd name="connsiteY8" fmla="*/ 799666 h 4100867"/>
+                <a:gd name="connsiteX9" fmla="*/ 4108052 w 4108288"/>
+                <a:gd name="connsiteY9" fmla="*/ 1129449 h 4100867"/>
+                <a:gd name="connsiteX10" fmla="*/ 3935665 w 4108288"/>
+                <a:gd name="connsiteY10" fmla="*/ 1429252 h 4100867"/>
+                <a:gd name="connsiteX11" fmla="*/ 3598386 w 4108288"/>
+                <a:gd name="connsiteY11" fmla="*/ 1541679 h 4100867"/>
+                <a:gd name="connsiteX12" fmla="*/ 3118700 w 4108288"/>
+                <a:gd name="connsiteY12" fmla="*/ 1421757 h 4100867"/>
+                <a:gd name="connsiteX13" fmla="*/ 2751442 w 4108288"/>
+                <a:gd name="connsiteY13" fmla="*/ 1466728 h 4100867"/>
+                <a:gd name="connsiteX14" fmla="*/ 1739606 w 4108288"/>
+                <a:gd name="connsiteY14" fmla="*/ 2463574 h 4100867"/>
+                <a:gd name="connsiteX15" fmla="*/ 1319881 w 4108288"/>
+                <a:gd name="connsiteY15" fmla="*/ 3025705 h 4100867"/>
+                <a:gd name="connsiteX16" fmla="*/ 1274911 w 4108288"/>
+                <a:gd name="connsiteY16" fmla="*/ 3333003 h 4100867"/>
+                <a:gd name="connsiteX17" fmla="*/ 1394832 w 4108288"/>
+                <a:gd name="connsiteY17" fmla="*/ 3812689 h 4100867"/>
+                <a:gd name="connsiteX18" fmla="*/ 1207455 w 4108288"/>
+                <a:gd name="connsiteY18" fmla="*/ 4097502 h 4100867"/>
+                <a:gd name="connsiteX19" fmla="*/ 847691 w 4108288"/>
+                <a:gd name="connsiteY19" fmla="*/ 3940105 h 4100867"/>
+                <a:gd name="connsiteX20" fmla="*/ 637829 w 4108288"/>
+                <a:gd name="connsiteY20" fmla="*/ 3520380 h 4100867"/>
+                <a:gd name="connsiteX21" fmla="*/ 435461 w 4108288"/>
+                <a:gd name="connsiteY21" fmla="*/ 3467915 h 4100867"/>
+                <a:gd name="connsiteX22" fmla="*/ 105678 w 4108288"/>
+                <a:gd name="connsiteY22" fmla="*/ 3370479 h 4100867"/>
+                <a:gd name="connsiteX23" fmla="*/ 8242 w 4108288"/>
+                <a:gd name="connsiteY23" fmla="*/ 3063180 h 4100867"/>
+                <a:gd name="connsiteX24" fmla="*/ 285560 w 4108288"/>
+                <a:gd name="connsiteY24" fmla="*/ 2740892 h 4100867"/>
+                <a:gd name="connsiteX25" fmla="*/ 1035068 w 4108288"/>
+                <a:gd name="connsiteY25" fmla="*/ 2433593 h 4100867"/>
+                <a:gd name="connsiteX0" fmla="*/ 1035068 w 4108288"/>
+                <a:gd name="connsiteY0" fmla="*/ 2433593 h 4100867"/>
+                <a:gd name="connsiteX1" fmla="*/ 1807062 w 4108288"/>
+                <a:gd name="connsiteY1" fmla="*/ 1624125 h 4100867"/>
+                <a:gd name="connsiteX2" fmla="*/ 2489114 w 4108288"/>
+                <a:gd name="connsiteY2" fmla="*/ 934577 h 4100867"/>
+                <a:gd name="connsiteX3" fmla="*/ 2564065 w 4108288"/>
+                <a:gd name="connsiteY3" fmla="*/ 447397 h 4100867"/>
+                <a:gd name="connsiteX4" fmla="*/ 2683986 w 4108288"/>
+                <a:gd name="connsiteY4" fmla="*/ 12682 h 4100867"/>
+                <a:gd name="connsiteX5" fmla="*/ 3036254 w 4108288"/>
+                <a:gd name="connsiteY5" fmla="*/ 162583 h 4100867"/>
+                <a:gd name="connsiteX6" fmla="*/ 3246117 w 4108288"/>
+                <a:gd name="connsiteY6" fmla="*/ 634774 h 4100867"/>
+                <a:gd name="connsiteX7" fmla="*/ 3673337 w 4108288"/>
+                <a:gd name="connsiteY7" fmla="*/ 627279 h 4100867"/>
+                <a:gd name="connsiteX8" fmla="*/ 3965645 w 4108288"/>
+                <a:gd name="connsiteY8" fmla="*/ 799666 h 4100867"/>
+                <a:gd name="connsiteX9" fmla="*/ 4108052 w 4108288"/>
+                <a:gd name="connsiteY9" fmla="*/ 1129449 h 4100867"/>
+                <a:gd name="connsiteX10" fmla="*/ 3935665 w 4108288"/>
+                <a:gd name="connsiteY10" fmla="*/ 1429252 h 4100867"/>
+                <a:gd name="connsiteX11" fmla="*/ 3598386 w 4108288"/>
+                <a:gd name="connsiteY11" fmla="*/ 1541679 h 4100867"/>
+                <a:gd name="connsiteX12" fmla="*/ 3118700 w 4108288"/>
+                <a:gd name="connsiteY12" fmla="*/ 1421757 h 4100867"/>
+                <a:gd name="connsiteX13" fmla="*/ 2751442 w 4108288"/>
+                <a:gd name="connsiteY13" fmla="*/ 1466728 h 4100867"/>
+                <a:gd name="connsiteX14" fmla="*/ 1739606 w 4108288"/>
+                <a:gd name="connsiteY14" fmla="*/ 2463574 h 4100867"/>
+                <a:gd name="connsiteX15" fmla="*/ 1319881 w 4108288"/>
+                <a:gd name="connsiteY15" fmla="*/ 3025705 h 4100867"/>
+                <a:gd name="connsiteX16" fmla="*/ 1274911 w 4108288"/>
+                <a:gd name="connsiteY16" fmla="*/ 3333003 h 4100867"/>
+                <a:gd name="connsiteX17" fmla="*/ 1394832 w 4108288"/>
+                <a:gd name="connsiteY17" fmla="*/ 3812689 h 4100867"/>
+                <a:gd name="connsiteX18" fmla="*/ 1207455 w 4108288"/>
+                <a:gd name="connsiteY18" fmla="*/ 4097502 h 4100867"/>
+                <a:gd name="connsiteX19" fmla="*/ 847691 w 4108288"/>
+                <a:gd name="connsiteY19" fmla="*/ 3940105 h 4100867"/>
+                <a:gd name="connsiteX20" fmla="*/ 637829 w 4108288"/>
+                <a:gd name="connsiteY20" fmla="*/ 3520380 h 4100867"/>
+                <a:gd name="connsiteX21" fmla="*/ 435461 w 4108288"/>
+                <a:gd name="connsiteY21" fmla="*/ 3467915 h 4100867"/>
+                <a:gd name="connsiteX22" fmla="*/ 105678 w 4108288"/>
+                <a:gd name="connsiteY22" fmla="*/ 3370479 h 4100867"/>
+                <a:gd name="connsiteX23" fmla="*/ 8242 w 4108288"/>
+                <a:gd name="connsiteY23" fmla="*/ 3063180 h 4100867"/>
+                <a:gd name="connsiteX24" fmla="*/ 285560 w 4108288"/>
+                <a:gd name="connsiteY24" fmla="*/ 2740892 h 4100867"/>
+                <a:gd name="connsiteX25" fmla="*/ 1035068 w 4108288"/>
+                <a:gd name="connsiteY25" fmla="*/ 2433593 h 4100867"/>
+              </a:gdLst>
+              <a:ahLst/>
+              <a:cxnLst>
+                <a:cxn ang="0">
+                  <a:pos x="connsiteX0" y="connsiteY0"/>
+                </a:cxn>
+                <a:cxn ang="0">
+                  <a:pos x="connsiteX1" y="connsiteY1"/>
+                </a:cxn>
+                <a:cxn ang="0">
+                  <a:pos x="connsiteX2" y="connsiteY2"/>
+                </a:cxn>
+                <a:cxn ang="0">
+                  <a:pos x="connsiteX3" y="connsiteY3"/>
+                </a:cxn>
+                <a:cxn ang="0">
+                  <a:pos x="connsiteX4" y="connsiteY4"/>
+                </a:cxn>
+                <a:cxn ang="0">
+                  <a:pos x="connsiteX5" y="connsiteY5"/>
+                </a:cxn>
+                <a:cxn ang="0">
+                  <a:pos x="connsiteX6" y="connsiteY6"/>
+                </a:cxn>
+                <a:cxn ang="0">
+                  <a:pos x="connsiteX7" y="connsiteY7"/>
+                </a:cxn>
+                <a:cxn ang="0">
+                  <a:pos x="connsiteX8" y="connsiteY8"/>
+                </a:cxn>
+                <a:cxn ang="0">
+                  <a:pos x="connsiteX9" y="connsiteY9"/>
+                </a:cxn>
+                <a:cxn ang="0">
+                  <a:pos x="connsiteX10" y="connsiteY10"/>
+                </a:cxn>
+                <a:cxn ang="0">
+                  <a:pos x="connsiteX11" y="connsiteY11"/>
+                </a:cxn>
+                <a:cxn ang="0">
+                  <a:pos x="connsiteX12" y="connsiteY12"/>
+                </a:cxn>
+                <a:cxn ang="0">
+                  <a:pos x="connsiteX13" y="connsiteY13"/>
+                </a:cxn>
+                <a:cxn ang="0">
+                  <a:pos x="connsiteX14" y="connsiteY14"/>
+                </a:cxn>
+                <a:cxn ang="0">
+                  <a:pos x="connsiteX15" y="connsiteY15"/>
+                </a:cxn>
+                <a:cxn ang="0">
+                  <a:pos x="connsiteX16" y="connsiteY16"/>
+                </a:cxn>
+                <a:cxn ang="0">
+                  <a:pos x="connsiteX17" y="connsiteY17"/>
+                </a:cxn>
+                <a:cxn ang="0">
+                  <a:pos x="connsiteX18" y="connsiteY18"/>
+                </a:cxn>
+                <a:cxn ang="0">
+                  <a:pos x="connsiteX19" y="connsiteY19"/>
+                </a:cxn>
+                <a:cxn ang="0">
+                  <a:pos x="connsiteX20" y="connsiteY20"/>
+                </a:cxn>
+                <a:cxn ang="0">
+                  <a:pos x="connsiteX21" y="connsiteY21"/>
+                </a:cxn>
+                <a:cxn ang="0">
+                  <a:pos x="connsiteX22" y="connsiteY22"/>
+                </a:cxn>
+                <a:cxn ang="0">
+                  <a:pos x="connsiteX23" y="connsiteY23"/>
+                </a:cxn>
+                <a:cxn ang="0">
+                  <a:pos x="connsiteX24" y="connsiteY24"/>
+                </a:cxn>
+                <a:cxn ang="0">
+                  <a:pos x="connsiteX25" y="connsiteY25"/>
+                </a:cxn>
+              </a:cxnLst>
+              <a:rect l="l" t="t" r="r" b="b"/>
+              <a:pathLst>
+                <a:path w="4108288" h="4100867">
+                  <a:moveTo>
+                    <a:pt x="1035068" y="2433593"/>
+                  </a:moveTo>
+                  <a:cubicBezTo>
+                    <a:pt x="1288652" y="2247465"/>
+                    <a:pt x="1564721" y="1873961"/>
+                    <a:pt x="1807062" y="1624125"/>
+                  </a:cubicBezTo>
+                  <a:cubicBezTo>
+                    <a:pt x="2049403" y="1374289"/>
+                    <a:pt x="2362947" y="1130698"/>
+                    <a:pt x="2489114" y="934577"/>
+                  </a:cubicBezTo>
+                  <a:cubicBezTo>
+                    <a:pt x="2615281" y="738456"/>
+                    <a:pt x="2569062" y="608542"/>
+                    <a:pt x="2564065" y="447397"/>
+                  </a:cubicBezTo>
+                  <a:cubicBezTo>
+                    <a:pt x="2536583" y="301243"/>
+                    <a:pt x="2605288" y="60151"/>
+                    <a:pt x="2683986" y="12682"/>
+                  </a:cubicBezTo>
+                  <a:cubicBezTo>
+                    <a:pt x="2762684" y="-34787"/>
+                    <a:pt x="2942566" y="58901"/>
+                    <a:pt x="3036254" y="162583"/>
+                  </a:cubicBezTo>
+                  <a:cubicBezTo>
+                    <a:pt x="3129943" y="266265"/>
+                    <a:pt x="3139937" y="557325"/>
+                    <a:pt x="3246117" y="634774"/>
+                  </a:cubicBezTo>
+                  <a:cubicBezTo>
+                    <a:pt x="3352298" y="712223"/>
+                    <a:pt x="3553416" y="599797"/>
+                    <a:pt x="3673337" y="627279"/>
+                  </a:cubicBezTo>
+                  <a:cubicBezTo>
+                    <a:pt x="3793258" y="654761"/>
+                    <a:pt x="3893193" y="715971"/>
+                    <a:pt x="3965645" y="799666"/>
+                  </a:cubicBezTo>
+                  <a:cubicBezTo>
+                    <a:pt x="4038098" y="883361"/>
+                    <a:pt x="4113049" y="1024518"/>
+                    <a:pt x="4108052" y="1129449"/>
+                  </a:cubicBezTo>
+                  <a:cubicBezTo>
+                    <a:pt x="4103055" y="1234380"/>
+                    <a:pt x="4020609" y="1360547"/>
+                    <a:pt x="3935665" y="1429252"/>
+                  </a:cubicBezTo>
+                  <a:cubicBezTo>
+                    <a:pt x="3850721" y="1497957"/>
+                    <a:pt x="3734547" y="1542928"/>
+                    <a:pt x="3598386" y="1541679"/>
+                  </a:cubicBezTo>
+                  <a:cubicBezTo>
+                    <a:pt x="3462225" y="1540430"/>
+                    <a:pt x="3259857" y="1434249"/>
+                    <a:pt x="3118700" y="1421757"/>
+                  </a:cubicBezTo>
+                  <a:cubicBezTo>
+                    <a:pt x="2977543" y="1409265"/>
+                    <a:pt x="2981291" y="1293092"/>
+                    <a:pt x="2751442" y="1466728"/>
+                  </a:cubicBezTo>
+                  <a:cubicBezTo>
+                    <a:pt x="2521593" y="1640364"/>
+                    <a:pt x="1978199" y="2203745"/>
+                    <a:pt x="1739606" y="2463574"/>
+                  </a:cubicBezTo>
+                  <a:cubicBezTo>
+                    <a:pt x="1501013" y="2723403"/>
+                    <a:pt x="1397330" y="2880800"/>
+                    <a:pt x="1319881" y="3025705"/>
+                  </a:cubicBezTo>
+                  <a:cubicBezTo>
+                    <a:pt x="1242432" y="3170610"/>
+                    <a:pt x="1262419" y="3201839"/>
+                    <a:pt x="1274911" y="3333003"/>
+                  </a:cubicBezTo>
+                  <a:cubicBezTo>
+                    <a:pt x="1287403" y="3464167"/>
+                    <a:pt x="1406075" y="3685273"/>
+                    <a:pt x="1394832" y="3812689"/>
+                  </a:cubicBezTo>
+                  <a:cubicBezTo>
+                    <a:pt x="1383589" y="3940106"/>
+                    <a:pt x="1298645" y="4076266"/>
+                    <a:pt x="1207455" y="4097502"/>
+                  </a:cubicBezTo>
+                  <a:cubicBezTo>
+                    <a:pt x="1116265" y="4118738"/>
+                    <a:pt x="942629" y="4036292"/>
+                    <a:pt x="847691" y="3940105"/>
+                  </a:cubicBezTo>
+                  <a:cubicBezTo>
+                    <a:pt x="752753" y="3843918"/>
+                    <a:pt x="706534" y="3599078"/>
+                    <a:pt x="637829" y="3520380"/>
+                  </a:cubicBezTo>
+                  <a:cubicBezTo>
+                    <a:pt x="569124" y="3441682"/>
+                    <a:pt x="524153" y="3492899"/>
+                    <a:pt x="435461" y="3467915"/>
+                  </a:cubicBezTo>
+                  <a:cubicBezTo>
+                    <a:pt x="346769" y="3442931"/>
+                    <a:pt x="176881" y="3437935"/>
+                    <a:pt x="105678" y="3370479"/>
+                  </a:cubicBezTo>
+                  <a:cubicBezTo>
+                    <a:pt x="34475" y="3303023"/>
+                    <a:pt x="-21738" y="3168111"/>
+                    <a:pt x="8242" y="3063180"/>
+                  </a:cubicBezTo>
+                  <a:cubicBezTo>
+                    <a:pt x="38222" y="2958249"/>
+                    <a:pt x="165639" y="2794607"/>
+                    <a:pt x="285560" y="2740892"/>
+                  </a:cubicBezTo>
+                  <a:cubicBezTo>
+                    <a:pt x="456698" y="2635961"/>
+                    <a:pt x="781484" y="2619721"/>
+                    <a:pt x="1035068" y="2433593"/>
+                  </a:cubicBezTo>
+                  <a:close/>
+                </a:path>
+              </a:pathLst>
+            </a:custGeom>
+            <a:solidFill>
+              <a:srgbClr val="BFBFB3"/>
+            </a:solidFill>
+            <a:ln w="254000">
+              <a:solidFill>
+                <a:srgbClr val="50434A"/>
+              </a:solidFill>
+            </a:ln>
+          </p:spPr>
+          <p:style>
+            <a:lnRef idx="2">
+              <a:schemeClr val="accent1">
+                <a:shade val="50000"/>
+              </a:schemeClr>
+            </a:lnRef>
+            <a:fillRef idx="1">
+              <a:schemeClr val="accent1"/>
+            </a:fillRef>
+            <a:effectRef idx="0">
+              <a:schemeClr val="accent1"/>
+            </a:effectRef>
+            <a:fontRef idx="minor">
+              <a:schemeClr val="lt1"/>
+            </a:fontRef>
+          </p:style>
+          <p:txBody>
+            <a:bodyPr rtlCol="0" anchor="ctr"/>
+            <a:lstStyle/>
+            <a:p>
+              <a:pPr algn="ctr"/>
+              <a:endParaRPr lang="en-US"/>
+            </a:p>
+          </p:txBody>
+        </p:sp>
+      </p:grpSp>
+      <p:sp>
+        <p:nvSpPr>
+          <p:cNvPr id="5" name="TextBox 4">
+            <a:extLst>
+              <a:ext uri="{FF2B5EF4-FFF2-40B4-BE49-F238E27FC236}">
+                <a16:creationId xmlns:a16="http://schemas.microsoft.com/office/drawing/2014/main" id="{734136F1-B900-D21E-4C95-8C4F9672A09A}"/>
+              </a:ext>
+            </a:extLst>
+          </p:cNvPr>
+          <p:cNvSpPr txBox="1"/>
+          <p:nvPr/>
+        </p:nvSpPr>
+        <p:spPr>
+          <a:xfrm>
+            <a:off x="2902155" y="317413"/>
+            <a:ext cx="3632726" cy="1631216"/>
+          </a:xfrm>
+          <a:prstGeom prst="rect">
+            <a:avLst/>
+          </a:prstGeom>
+          <a:noFill/>
+        </p:spPr>
+        <p:txBody>
+          <a:bodyPr wrap="none" rtlCol="0">
+            <a:spAutoFit/>
+          </a:bodyPr>
+          <a:lstStyle/>
+          <a:p>
+            <a:r>
+              <a:rPr lang="en-US" sz="10000" dirty="0" err="1">
+                <a:solidFill>
+                  <a:srgbClr val="50434A"/>
+                </a:solidFill>
+                <a:latin typeface="Arial Rounded MT Bold" panose="020F0704030504030204" pitchFamily="34" charset="77"/>
+              </a:rPr>
+              <a:t>Phylo</a:t>
+            </a:r>
+            <a:endParaRPr lang="en-US" sz="10000" dirty="0">
+              <a:solidFill>
+                <a:srgbClr val="50434A"/>
+              </a:solidFill>
+              <a:latin typeface="Arial Rounded MT Bold" panose="020F0704030504030204" pitchFamily="34" charset="77"/>
+            </a:endParaRPr>
+          </a:p>
+        </p:txBody>
+      </p:sp>
+      <p:sp>
+        <p:nvSpPr>
+          <p:cNvPr id="6" name="TextBox 5">
+            <a:extLst>
+              <a:ext uri="{FF2B5EF4-FFF2-40B4-BE49-F238E27FC236}">
+                <a16:creationId xmlns:a16="http://schemas.microsoft.com/office/drawing/2014/main" id="{836F4801-4924-68E0-02A2-CF0C832BB506}"/>
+              </a:ext>
+            </a:extLst>
+          </p:cNvPr>
+          <p:cNvSpPr txBox="1"/>
+          <p:nvPr/>
+        </p:nvSpPr>
+        <p:spPr>
+          <a:xfrm>
+            <a:off x="5119839" y="4668765"/>
+            <a:ext cx="3935180" cy="1446550"/>
+          </a:xfrm>
+          <a:prstGeom prst="rect">
+            <a:avLst/>
+          </a:prstGeom>
+          <a:noFill/>
+        </p:spPr>
+        <p:txBody>
+          <a:bodyPr wrap="none" rtlCol="0">
+            <a:spAutoFit/>
+          </a:bodyPr>
+          <a:lstStyle/>
+          <a:p>
+            <a:r>
+              <a:rPr lang="en-US" sz="8800" dirty="0">
+                <a:solidFill>
+                  <a:srgbClr val="50434A"/>
+                </a:solidFill>
+                <a:latin typeface="Arial Rounded MT Bold" panose="020F0704030504030204" pitchFamily="34" charset="77"/>
+              </a:rPr>
+              <a:t>Sketch</a:t>
+            </a:r>
+          </a:p>
+        </p:txBody>
+      </p:sp>
+    </p:spTree>
+    <p:extLst>
+      <p:ext uri="{BB962C8B-B14F-4D97-AF65-F5344CB8AC3E}">
+        <p14:creationId xmlns:p14="http://schemas.microsoft.com/office/powerpoint/2010/main" val="3508164831"/>
+      </p:ext>
+    </p:extLst>
+  </p:cSld>
+  <p:clrMapOvr>
+    <a:masterClrMapping/>
+  </p:clrMapOvr>
+</p:sld>
+</file>
+
 <file path=ppt/theme/theme1.xml><?xml version="1.0" encoding="utf-8"?>
 <a:theme xmlns:a="http://schemas.openxmlformats.org/drawingml/2006/main" name="Office Theme">
   <a:themeElements>

</xml_diff>